<commit_message>
Add Enabled wiring to ESP-01 schema
</commit_message>
<xml_diff>
--- a/doc/Schema.pptx
+++ b/doc/Schema.pptx
@@ -263,7 +263,7 @@
           <a:p>
             <a:fld id="{D58ECB9C-8DE8-42B4-895D-7C00461DBC4F}" type="datetimeFigureOut">
               <a:rPr lang="en-BE" smtClean="0"/>
-              <a:t>25/01/2024</a:t>
+              <a:t>26/01/2024</a:t>
             </a:fld>
             <a:endParaRPr lang="en-BE"/>
           </a:p>
@@ -463,7 +463,7 @@
           <a:p>
             <a:fld id="{D58ECB9C-8DE8-42B4-895D-7C00461DBC4F}" type="datetimeFigureOut">
               <a:rPr lang="en-BE" smtClean="0"/>
-              <a:t>25/01/2024</a:t>
+              <a:t>26/01/2024</a:t>
             </a:fld>
             <a:endParaRPr lang="en-BE"/>
           </a:p>
@@ -673,7 +673,7 @@
           <a:p>
             <a:fld id="{D58ECB9C-8DE8-42B4-895D-7C00461DBC4F}" type="datetimeFigureOut">
               <a:rPr lang="en-BE" smtClean="0"/>
-              <a:t>25/01/2024</a:t>
+              <a:t>26/01/2024</a:t>
             </a:fld>
             <a:endParaRPr lang="en-BE"/>
           </a:p>
@@ -873,7 +873,7 @@
           <a:p>
             <a:fld id="{D58ECB9C-8DE8-42B4-895D-7C00461DBC4F}" type="datetimeFigureOut">
               <a:rPr lang="en-BE" smtClean="0"/>
-              <a:t>25/01/2024</a:t>
+              <a:t>26/01/2024</a:t>
             </a:fld>
             <a:endParaRPr lang="en-BE"/>
           </a:p>
@@ -1149,7 +1149,7 @@
           <a:p>
             <a:fld id="{D58ECB9C-8DE8-42B4-895D-7C00461DBC4F}" type="datetimeFigureOut">
               <a:rPr lang="en-BE" smtClean="0"/>
-              <a:t>25/01/2024</a:t>
+              <a:t>26/01/2024</a:t>
             </a:fld>
             <a:endParaRPr lang="en-BE"/>
           </a:p>
@@ -1417,7 +1417,7 @@
           <a:p>
             <a:fld id="{D58ECB9C-8DE8-42B4-895D-7C00461DBC4F}" type="datetimeFigureOut">
               <a:rPr lang="en-BE" smtClean="0"/>
-              <a:t>25/01/2024</a:t>
+              <a:t>26/01/2024</a:t>
             </a:fld>
             <a:endParaRPr lang="en-BE"/>
           </a:p>
@@ -1832,7 +1832,7 @@
           <a:p>
             <a:fld id="{D58ECB9C-8DE8-42B4-895D-7C00461DBC4F}" type="datetimeFigureOut">
               <a:rPr lang="en-BE" smtClean="0"/>
-              <a:t>25/01/2024</a:t>
+              <a:t>26/01/2024</a:t>
             </a:fld>
             <a:endParaRPr lang="en-BE"/>
           </a:p>
@@ -1974,7 +1974,7 @@
           <a:p>
             <a:fld id="{D58ECB9C-8DE8-42B4-895D-7C00461DBC4F}" type="datetimeFigureOut">
               <a:rPr lang="en-BE" smtClean="0"/>
-              <a:t>25/01/2024</a:t>
+              <a:t>26/01/2024</a:t>
             </a:fld>
             <a:endParaRPr lang="en-BE"/>
           </a:p>
@@ -2087,7 +2087,7 @@
           <a:p>
             <a:fld id="{D58ECB9C-8DE8-42B4-895D-7C00461DBC4F}" type="datetimeFigureOut">
               <a:rPr lang="en-BE" smtClean="0"/>
-              <a:t>25/01/2024</a:t>
+              <a:t>26/01/2024</a:t>
             </a:fld>
             <a:endParaRPr lang="en-BE"/>
           </a:p>
@@ -2400,7 +2400,7 @@
           <a:p>
             <a:fld id="{D58ECB9C-8DE8-42B4-895D-7C00461DBC4F}" type="datetimeFigureOut">
               <a:rPr lang="en-BE" smtClean="0"/>
-              <a:t>25/01/2024</a:t>
+              <a:t>26/01/2024</a:t>
             </a:fld>
             <a:endParaRPr lang="en-BE"/>
           </a:p>
@@ -2689,7 +2689,7 @@
           <a:p>
             <a:fld id="{D58ECB9C-8DE8-42B4-895D-7C00461DBC4F}" type="datetimeFigureOut">
               <a:rPr lang="en-BE" smtClean="0"/>
-              <a:t>25/01/2024</a:t>
+              <a:t>26/01/2024</a:t>
             </a:fld>
             <a:endParaRPr lang="en-BE"/>
           </a:p>
@@ -2932,7 +2932,7 @@
           <a:p>
             <a:fld id="{D58ECB9C-8DE8-42B4-895D-7C00461DBC4F}" type="datetimeFigureOut">
               <a:rPr lang="en-BE" smtClean="0"/>
-              <a:t>25/01/2024</a:t>
+              <a:t>26/01/2024</a:t>
             </a:fld>
             <a:endParaRPr lang="en-BE"/>
           </a:p>
@@ -3572,6 +3572,803 @@
       </p:sp>
       <p:cxnSp>
         <p:nvCxnSpPr>
+          <p:cNvPr id="23" name="Connector: Curved 22">
+            <a:extLst>
+              <a:ext uri="{FF2B5EF4-FFF2-40B4-BE49-F238E27FC236}">
+                <a16:creationId xmlns:a16="http://schemas.microsoft.com/office/drawing/2014/main" id="{55FF0AC9-90F2-4775-4390-2396E558E726}"/>
+              </a:ext>
+            </a:extLst>
+          </p:cNvPr>
+          <p:cNvCxnSpPr>
+            <a:cxnSpLocks/>
+            <a:endCxn id="11" idx="1"/>
+          </p:cNvCxnSpPr>
+          <p:nvPr/>
+        </p:nvCxnSpPr>
+        <p:spPr>
+          <a:xfrm rot="16200000" flipH="1">
+            <a:off x="7907134" y="3018569"/>
+            <a:ext cx="386537" cy="377369"/>
+          </a:xfrm>
+          <a:prstGeom prst="curvedConnector2">
+            <a:avLst/>
+          </a:prstGeom>
+          <a:ln w="12700" cap="flat" cmpd="sng" algn="ctr">
+            <a:solidFill>
+              <a:schemeClr val="accent3"/>
+            </a:solidFill>
+            <a:prstDash val="dash"/>
+            <a:round/>
+            <a:headEnd type="none" w="med" len="med"/>
+            <a:tailEnd type="triangle" w="med" len="med"/>
+          </a:ln>
+        </p:spPr>
+        <p:style>
+          <a:lnRef idx="0">
+            <a:scrgbClr r="0" g="0" b="0"/>
+          </a:lnRef>
+          <a:fillRef idx="0">
+            <a:scrgbClr r="0" g="0" b="0"/>
+          </a:fillRef>
+          <a:effectRef idx="0">
+            <a:scrgbClr r="0" g="0" b="0"/>
+          </a:effectRef>
+          <a:fontRef idx="minor">
+            <a:schemeClr val="tx1"/>
+          </a:fontRef>
+        </p:style>
+      </p:cxnSp>
+      <p:sp>
+        <p:nvSpPr>
+          <p:cNvPr id="29" name="TextBox 28">
+            <a:extLst>
+              <a:ext uri="{FF2B5EF4-FFF2-40B4-BE49-F238E27FC236}">
+                <a16:creationId xmlns:a16="http://schemas.microsoft.com/office/drawing/2014/main" id="{9E1A6D08-F249-C1C4-BD94-13A9543ED8B3}"/>
+              </a:ext>
+            </a:extLst>
+          </p:cNvPr>
+          <p:cNvSpPr txBox="1"/>
+          <p:nvPr/>
+        </p:nvSpPr>
+        <p:spPr>
+          <a:xfrm>
+            <a:off x="6793309" y="2455571"/>
+            <a:ext cx="526106" cy="276999"/>
+          </a:xfrm>
+          <a:prstGeom prst="rect">
+            <a:avLst/>
+          </a:prstGeom>
+          <a:noFill/>
+        </p:spPr>
+        <p:txBody>
+          <a:bodyPr wrap="none" rtlCol="0">
+            <a:spAutoFit/>
+          </a:bodyPr>
+          <a:lstStyle/>
+          <a:p>
+            <a:r>
+              <a:rPr lang="en-US" sz="1200" dirty="0">
+                <a:latin typeface="Arial" panose="020B0604020202020204" pitchFamily="34" charset="0"/>
+                <a:cs typeface="Arial" panose="020B0604020202020204" pitchFamily="34" charset="0"/>
+              </a:rPr>
+              <a:t>GND</a:t>
+            </a:r>
+            <a:endParaRPr lang="en-BE" sz="1200" dirty="0">
+              <a:latin typeface="Arial" panose="020B0604020202020204" pitchFamily="34" charset="0"/>
+              <a:cs typeface="Arial" panose="020B0604020202020204" pitchFamily="34" charset="0"/>
+            </a:endParaRPr>
+          </a:p>
+        </p:txBody>
+      </p:sp>
+      <p:cxnSp>
+        <p:nvCxnSpPr>
+          <p:cNvPr id="32" name="Connector: Curved 31">
+            <a:extLst>
+              <a:ext uri="{FF2B5EF4-FFF2-40B4-BE49-F238E27FC236}">
+                <a16:creationId xmlns:a16="http://schemas.microsoft.com/office/drawing/2014/main" id="{6104BC5F-D891-BC60-9844-6F336D483A21}"/>
+              </a:ext>
+            </a:extLst>
+          </p:cNvPr>
+          <p:cNvCxnSpPr>
+            <a:cxnSpLocks/>
+            <a:endCxn id="35" idx="3"/>
+          </p:cNvCxnSpPr>
+          <p:nvPr/>
+        </p:nvCxnSpPr>
+        <p:spPr>
+          <a:xfrm rot="10800000" flipV="1">
+            <a:off x="2738982" y="4176655"/>
+            <a:ext cx="332751" cy="166434"/>
+          </a:xfrm>
+          <a:prstGeom prst="curvedConnector3">
+            <a:avLst>
+              <a:gd name="adj1" fmla="val 50000"/>
+            </a:avLst>
+          </a:prstGeom>
+          <a:ln w="12700" cap="flat" cmpd="sng" algn="ctr">
+            <a:solidFill>
+              <a:schemeClr val="accent3"/>
+            </a:solidFill>
+            <a:prstDash val="dash"/>
+            <a:round/>
+            <a:headEnd type="none" w="med" len="med"/>
+            <a:tailEnd type="triangle" w="med" len="med"/>
+          </a:ln>
+        </p:spPr>
+        <p:style>
+          <a:lnRef idx="0">
+            <a:scrgbClr r="0" g="0" b="0"/>
+          </a:lnRef>
+          <a:fillRef idx="0">
+            <a:scrgbClr r="0" g="0" b="0"/>
+          </a:fillRef>
+          <a:effectRef idx="0">
+            <a:scrgbClr r="0" g="0" b="0"/>
+          </a:effectRef>
+          <a:fontRef idx="minor">
+            <a:schemeClr val="tx1"/>
+          </a:fontRef>
+        </p:style>
+      </p:cxnSp>
+      <p:sp>
+        <p:nvSpPr>
+          <p:cNvPr id="34" name="TextBox 33">
+            <a:extLst>
+              <a:ext uri="{FF2B5EF4-FFF2-40B4-BE49-F238E27FC236}">
+                <a16:creationId xmlns:a16="http://schemas.microsoft.com/office/drawing/2014/main" id="{D3D37389-8B99-FF18-A098-8427A42158C5}"/>
+              </a:ext>
+            </a:extLst>
+          </p:cNvPr>
+          <p:cNvSpPr txBox="1"/>
+          <p:nvPr/>
+        </p:nvSpPr>
+        <p:spPr>
+          <a:xfrm>
+            <a:off x="2224945" y="3227519"/>
+            <a:ext cx="372218" cy="276999"/>
+          </a:xfrm>
+          <a:prstGeom prst="rect">
+            <a:avLst/>
+          </a:prstGeom>
+          <a:noFill/>
+        </p:spPr>
+        <p:txBody>
+          <a:bodyPr wrap="none" rtlCol="0">
+            <a:spAutoFit/>
+          </a:bodyPr>
+          <a:lstStyle/>
+          <a:p>
+            <a:r>
+              <a:rPr lang="en-US" sz="1200" dirty="0">
+                <a:latin typeface="Arial" panose="020B0604020202020204" pitchFamily="34" charset="0"/>
+                <a:cs typeface="Arial" panose="020B0604020202020204" pitchFamily="34" charset="0"/>
+              </a:rPr>
+              <a:t>5V</a:t>
+            </a:r>
+            <a:endParaRPr lang="en-BE" sz="1200" dirty="0">
+              <a:latin typeface="Arial" panose="020B0604020202020204" pitchFamily="34" charset="0"/>
+              <a:cs typeface="Arial" panose="020B0604020202020204" pitchFamily="34" charset="0"/>
+            </a:endParaRPr>
+          </a:p>
+        </p:txBody>
+      </p:sp>
+      <p:sp>
+        <p:nvSpPr>
+          <p:cNvPr id="35" name="TextBox 34">
+            <a:extLst>
+              <a:ext uri="{FF2B5EF4-FFF2-40B4-BE49-F238E27FC236}">
+                <a16:creationId xmlns:a16="http://schemas.microsoft.com/office/drawing/2014/main" id="{5E90D989-B577-C101-320E-3B6E9D2D733F}"/>
+              </a:ext>
+            </a:extLst>
+          </p:cNvPr>
+          <p:cNvSpPr txBox="1"/>
+          <p:nvPr/>
+        </p:nvSpPr>
+        <p:spPr>
+          <a:xfrm>
+            <a:off x="2212875" y="4204589"/>
+            <a:ext cx="526106" cy="276999"/>
+          </a:xfrm>
+          <a:prstGeom prst="rect">
+            <a:avLst/>
+          </a:prstGeom>
+          <a:noFill/>
+        </p:spPr>
+        <p:txBody>
+          <a:bodyPr wrap="none" rtlCol="0">
+            <a:spAutoFit/>
+          </a:bodyPr>
+          <a:lstStyle/>
+          <a:p>
+            <a:r>
+              <a:rPr lang="en-US" sz="1200" dirty="0">
+                <a:latin typeface="Arial" panose="020B0604020202020204" pitchFamily="34" charset="0"/>
+                <a:cs typeface="Arial" panose="020B0604020202020204" pitchFamily="34" charset="0"/>
+              </a:rPr>
+              <a:t>GND</a:t>
+            </a:r>
+            <a:endParaRPr lang="en-BE" sz="1200" dirty="0">
+              <a:latin typeface="Arial" panose="020B0604020202020204" pitchFamily="34" charset="0"/>
+              <a:cs typeface="Arial" panose="020B0604020202020204" pitchFamily="34" charset="0"/>
+            </a:endParaRPr>
+          </a:p>
+        </p:txBody>
+      </p:sp>
+      <p:sp>
+        <p:nvSpPr>
+          <p:cNvPr id="36" name="TextBox 35">
+            <a:extLst>
+              <a:ext uri="{FF2B5EF4-FFF2-40B4-BE49-F238E27FC236}">
+                <a16:creationId xmlns:a16="http://schemas.microsoft.com/office/drawing/2014/main" id="{DF4658B5-240F-8219-5301-3BE263AFDCB8}"/>
+              </a:ext>
+            </a:extLst>
+          </p:cNvPr>
+          <p:cNvSpPr txBox="1"/>
+          <p:nvPr/>
+        </p:nvSpPr>
+        <p:spPr>
+          <a:xfrm>
+            <a:off x="2224945" y="3971232"/>
+            <a:ext cx="508473" cy="276999"/>
+          </a:xfrm>
+          <a:prstGeom prst="rect">
+            <a:avLst/>
+          </a:prstGeom>
+          <a:noFill/>
+        </p:spPr>
+        <p:txBody>
+          <a:bodyPr wrap="none" rtlCol="0">
+            <a:spAutoFit/>
+          </a:bodyPr>
+          <a:lstStyle/>
+          <a:p>
+            <a:r>
+              <a:rPr lang="en-US" sz="1200" dirty="0">
+                <a:latin typeface="Arial" panose="020B0604020202020204" pitchFamily="34" charset="0"/>
+                <a:cs typeface="Arial" panose="020B0604020202020204" pitchFamily="34" charset="0"/>
+              </a:rPr>
+              <a:t>RXD</a:t>
+            </a:r>
+            <a:endParaRPr lang="en-BE" sz="1200" dirty="0">
+              <a:latin typeface="Arial" panose="020B0604020202020204" pitchFamily="34" charset="0"/>
+              <a:cs typeface="Arial" panose="020B0604020202020204" pitchFamily="34" charset="0"/>
+            </a:endParaRPr>
+          </a:p>
+        </p:txBody>
+      </p:sp>
+      <p:sp>
+        <p:nvSpPr>
+          <p:cNvPr id="37" name="TextBox 36">
+            <a:extLst>
+              <a:ext uri="{FF2B5EF4-FFF2-40B4-BE49-F238E27FC236}">
+                <a16:creationId xmlns:a16="http://schemas.microsoft.com/office/drawing/2014/main" id="{EC6591E1-2055-FBD9-4BB7-6CF13E90B30D}"/>
+              </a:ext>
+            </a:extLst>
+          </p:cNvPr>
+          <p:cNvSpPr txBox="1"/>
+          <p:nvPr/>
+        </p:nvSpPr>
+        <p:spPr>
+          <a:xfrm>
+            <a:off x="2212875" y="3694233"/>
+            <a:ext cx="526106" cy="276999"/>
+          </a:xfrm>
+          <a:prstGeom prst="rect">
+            <a:avLst/>
+          </a:prstGeom>
+          <a:noFill/>
+        </p:spPr>
+        <p:txBody>
+          <a:bodyPr wrap="none" rtlCol="0">
+            <a:spAutoFit/>
+          </a:bodyPr>
+          <a:lstStyle/>
+          <a:p>
+            <a:pPr algn="ctr"/>
+            <a:r>
+              <a:rPr lang="en-US" sz="1200" dirty="0">
+                <a:latin typeface="Arial" panose="020B0604020202020204" pitchFamily="34" charset="0"/>
+                <a:cs typeface="Arial" panose="020B0604020202020204" pitchFamily="34" charset="0"/>
+              </a:rPr>
+              <a:t>GND</a:t>
+            </a:r>
+            <a:endParaRPr lang="en-BE" sz="1200" dirty="0">
+              <a:latin typeface="Arial" panose="020B0604020202020204" pitchFamily="34" charset="0"/>
+              <a:cs typeface="Arial" panose="020B0604020202020204" pitchFamily="34" charset="0"/>
+            </a:endParaRPr>
+          </a:p>
+        </p:txBody>
+      </p:sp>
+      <p:sp>
+        <p:nvSpPr>
+          <p:cNvPr id="38" name="TextBox 37">
+            <a:extLst>
+              <a:ext uri="{FF2B5EF4-FFF2-40B4-BE49-F238E27FC236}">
+                <a16:creationId xmlns:a16="http://schemas.microsoft.com/office/drawing/2014/main" id="{C46353F3-5B5D-2FA3-BE44-8F2362563881}"/>
+              </a:ext>
+            </a:extLst>
+          </p:cNvPr>
+          <p:cNvSpPr txBox="1"/>
+          <p:nvPr/>
+        </p:nvSpPr>
+        <p:spPr>
+          <a:xfrm>
+            <a:off x="2212875" y="3460876"/>
+            <a:ext cx="489686" cy="276999"/>
+          </a:xfrm>
+          <a:prstGeom prst="rect">
+            <a:avLst/>
+          </a:prstGeom>
+          <a:noFill/>
+        </p:spPr>
+        <p:txBody>
+          <a:bodyPr wrap="none" rtlCol="0">
+            <a:spAutoFit/>
+          </a:bodyPr>
+          <a:lstStyle/>
+          <a:p>
+            <a:r>
+              <a:rPr lang="en-US" sz="1200" dirty="0">
+                <a:latin typeface="Arial" panose="020B0604020202020204" pitchFamily="34" charset="0"/>
+                <a:cs typeface="Arial" panose="020B0604020202020204" pitchFamily="34" charset="0"/>
+              </a:rPr>
+              <a:t>RTS</a:t>
+            </a:r>
+            <a:endParaRPr lang="en-BE" sz="1200" dirty="0">
+              <a:latin typeface="Arial" panose="020B0604020202020204" pitchFamily="34" charset="0"/>
+              <a:cs typeface="Arial" panose="020B0604020202020204" pitchFamily="34" charset="0"/>
+            </a:endParaRPr>
+          </a:p>
+        </p:txBody>
+      </p:sp>
+      <p:cxnSp>
+        <p:nvCxnSpPr>
+          <p:cNvPr id="40" name="Connector: Curved 39">
+            <a:extLst>
+              <a:ext uri="{FF2B5EF4-FFF2-40B4-BE49-F238E27FC236}">
+                <a16:creationId xmlns:a16="http://schemas.microsoft.com/office/drawing/2014/main" id="{58872BCD-AAA4-EC5D-9E99-ACF6B9BDA00F}"/>
+              </a:ext>
+            </a:extLst>
+          </p:cNvPr>
+          <p:cNvCxnSpPr>
+            <a:cxnSpLocks/>
+            <a:endCxn id="36" idx="3"/>
+          </p:cNvCxnSpPr>
+          <p:nvPr/>
+        </p:nvCxnSpPr>
+        <p:spPr>
+          <a:xfrm rot="10800000" flipV="1">
+            <a:off x="2733419" y="4031612"/>
+            <a:ext cx="338317" cy="78119"/>
+          </a:xfrm>
+          <a:prstGeom prst="curvedConnector3">
+            <a:avLst>
+              <a:gd name="adj1" fmla="val 50000"/>
+            </a:avLst>
+          </a:prstGeom>
+          <a:ln w="12700" cap="flat" cmpd="sng" algn="ctr">
+            <a:solidFill>
+              <a:schemeClr val="accent3"/>
+            </a:solidFill>
+            <a:prstDash val="dash"/>
+            <a:round/>
+            <a:headEnd type="none" w="med" len="med"/>
+            <a:tailEnd type="triangle" w="med" len="med"/>
+          </a:ln>
+        </p:spPr>
+        <p:style>
+          <a:lnRef idx="0">
+            <a:scrgbClr r="0" g="0" b="0"/>
+          </a:lnRef>
+          <a:fillRef idx="0">
+            <a:scrgbClr r="0" g="0" b="0"/>
+          </a:fillRef>
+          <a:effectRef idx="0">
+            <a:scrgbClr r="0" g="0" b="0"/>
+          </a:effectRef>
+          <a:fontRef idx="minor">
+            <a:schemeClr val="tx1"/>
+          </a:fontRef>
+        </p:style>
+      </p:cxnSp>
+      <p:cxnSp>
+        <p:nvCxnSpPr>
+          <p:cNvPr id="43" name="Connector: Curved 42">
+            <a:extLst>
+              <a:ext uri="{FF2B5EF4-FFF2-40B4-BE49-F238E27FC236}">
+                <a16:creationId xmlns:a16="http://schemas.microsoft.com/office/drawing/2014/main" id="{115DC5BA-8414-55D8-99C5-4E41A8DB99F9}"/>
+              </a:ext>
+            </a:extLst>
+          </p:cNvPr>
+          <p:cNvCxnSpPr>
+            <a:cxnSpLocks/>
+            <a:endCxn id="37" idx="3"/>
+          </p:cNvCxnSpPr>
+          <p:nvPr/>
+        </p:nvCxnSpPr>
+        <p:spPr>
+          <a:xfrm rot="10800000">
+            <a:off x="2738981" y="3832734"/>
+            <a:ext cx="332752" cy="7859"/>
+          </a:xfrm>
+          <a:prstGeom prst="curvedConnector3">
+            <a:avLst>
+              <a:gd name="adj1" fmla="val 50000"/>
+            </a:avLst>
+          </a:prstGeom>
+          <a:ln w="12700" cap="flat" cmpd="sng" algn="ctr">
+            <a:solidFill>
+              <a:schemeClr val="accent3"/>
+            </a:solidFill>
+            <a:prstDash val="dash"/>
+            <a:round/>
+            <a:headEnd type="none" w="med" len="med"/>
+            <a:tailEnd type="triangle" w="med" len="med"/>
+          </a:ln>
+        </p:spPr>
+        <p:style>
+          <a:lnRef idx="0">
+            <a:scrgbClr r="0" g="0" b="0"/>
+          </a:lnRef>
+          <a:fillRef idx="0">
+            <a:scrgbClr r="0" g="0" b="0"/>
+          </a:fillRef>
+          <a:effectRef idx="0">
+            <a:scrgbClr r="0" g="0" b="0"/>
+          </a:effectRef>
+          <a:fontRef idx="minor">
+            <a:schemeClr val="tx1"/>
+          </a:fontRef>
+        </p:style>
+      </p:cxnSp>
+      <p:cxnSp>
+        <p:nvCxnSpPr>
+          <p:cNvPr id="46" name="Connector: Curved 45">
+            <a:extLst>
+              <a:ext uri="{FF2B5EF4-FFF2-40B4-BE49-F238E27FC236}">
+                <a16:creationId xmlns:a16="http://schemas.microsoft.com/office/drawing/2014/main" id="{21A6DAF1-AF42-82E0-F8B5-EF91EE0C8794}"/>
+              </a:ext>
+            </a:extLst>
+          </p:cNvPr>
+          <p:cNvCxnSpPr>
+            <a:cxnSpLocks/>
+          </p:cNvCxnSpPr>
+          <p:nvPr/>
+        </p:nvCxnSpPr>
+        <p:spPr>
+          <a:xfrm rot="10800000">
+            <a:off x="2651385" y="3357149"/>
+            <a:ext cx="420348" cy="283236"/>
+          </a:xfrm>
+          <a:prstGeom prst="curvedConnector3">
+            <a:avLst>
+              <a:gd name="adj1" fmla="val 50000"/>
+            </a:avLst>
+          </a:prstGeom>
+          <a:ln w="12700" cap="flat" cmpd="sng" algn="ctr">
+            <a:solidFill>
+              <a:schemeClr val="accent3"/>
+            </a:solidFill>
+            <a:prstDash val="dash"/>
+            <a:round/>
+            <a:headEnd type="none" w="med" len="med"/>
+            <a:tailEnd type="triangle" w="med" len="med"/>
+          </a:ln>
+        </p:spPr>
+        <p:style>
+          <a:lnRef idx="0">
+            <a:scrgbClr r="0" g="0" b="0"/>
+          </a:lnRef>
+          <a:fillRef idx="0">
+            <a:scrgbClr r="0" g="0" b="0"/>
+          </a:fillRef>
+          <a:effectRef idx="0">
+            <a:scrgbClr r="0" g="0" b="0"/>
+          </a:effectRef>
+          <a:fontRef idx="minor">
+            <a:schemeClr val="tx1"/>
+          </a:fontRef>
+        </p:style>
+      </p:cxnSp>
+      <p:cxnSp>
+        <p:nvCxnSpPr>
+          <p:cNvPr id="49" name="Connector: Curved 48">
+            <a:extLst>
+              <a:ext uri="{FF2B5EF4-FFF2-40B4-BE49-F238E27FC236}">
+                <a16:creationId xmlns:a16="http://schemas.microsoft.com/office/drawing/2014/main" id="{90338CFC-78E6-4967-F0A6-68AAB2688550}"/>
+              </a:ext>
+            </a:extLst>
+          </p:cNvPr>
+          <p:cNvCxnSpPr>
+            <a:cxnSpLocks/>
+          </p:cNvCxnSpPr>
+          <p:nvPr/>
+        </p:nvCxnSpPr>
+        <p:spPr>
+          <a:xfrm rot="10800000">
+            <a:off x="2666141" y="3590506"/>
+            <a:ext cx="405592" cy="153788"/>
+          </a:xfrm>
+          <a:prstGeom prst="curvedConnector3">
+            <a:avLst>
+              <a:gd name="adj1" fmla="val 50000"/>
+            </a:avLst>
+          </a:prstGeom>
+          <a:ln w="12700" cap="flat" cmpd="sng" algn="ctr">
+            <a:solidFill>
+              <a:schemeClr val="accent3"/>
+            </a:solidFill>
+            <a:prstDash val="dash"/>
+            <a:round/>
+            <a:headEnd type="none" w="med" len="med"/>
+            <a:tailEnd type="triangle" w="med" len="med"/>
+          </a:ln>
+        </p:spPr>
+        <p:style>
+          <a:lnRef idx="0">
+            <a:scrgbClr r="0" g="0" b="0"/>
+          </a:lnRef>
+          <a:fillRef idx="0">
+            <a:scrgbClr r="0" g="0" b="0"/>
+          </a:fillRef>
+          <a:effectRef idx="0">
+            <a:scrgbClr r="0" g="0" b="0"/>
+          </a:effectRef>
+          <a:fontRef idx="minor">
+            <a:schemeClr val="tx1"/>
+          </a:fontRef>
+        </p:style>
+      </p:cxnSp>
+      <p:sp>
+        <p:nvSpPr>
+          <p:cNvPr id="53" name="AutoShape 2" descr="RJ45 Rj11 Rj12 Rj9 Telephone Patch Cord Cat3 Telephone Cable 24AWG 6p6c  Telephone Patch Cord 7 Foot 8 Foot 9 Foot - China Telephone Cable, 4core  Telephone Cable | Made-in-China.com">
+            <a:extLst>
+              <a:ext uri="{FF2B5EF4-FFF2-40B4-BE49-F238E27FC236}">
+                <a16:creationId xmlns:a16="http://schemas.microsoft.com/office/drawing/2014/main" id="{AF01B2DC-B839-FCD4-8F6D-E44C478BED41}"/>
+              </a:ext>
+            </a:extLst>
+          </p:cNvPr>
+          <p:cNvSpPr>
+            <a:spLocks noChangeAspect="1" noChangeArrowheads="1"/>
+          </p:cNvSpPr>
+          <p:nvPr/>
+        </p:nvSpPr>
+        <p:spPr bwMode="auto">
+          <a:xfrm>
+            <a:off x="5943600" y="3276600"/>
+            <a:ext cx="304800" cy="304800"/>
+          </a:xfrm>
+          <a:prstGeom prst="rect">
+            <a:avLst/>
+          </a:prstGeom>
+          <a:noFill/>
+          <a:extLst>
+            <a:ext uri="{909E8E84-426E-40DD-AFC4-6F175D3DCCD1}">
+              <a14:hiddenFill xmlns:a14="http://schemas.microsoft.com/office/drawing/2010/main">
+                <a:solidFill>
+                  <a:srgbClr val="FFFFFF"/>
+                </a:solidFill>
+              </a14:hiddenFill>
+            </a:ext>
+          </a:extLst>
+        </p:spPr>
+        <p:txBody>
+          <a:bodyPr vert="horz" wrap="square" lIns="91440" tIns="45720" rIns="91440" bIns="45720" numCol="1" anchor="t" anchorCtr="0" compatLnSpc="1">
+            <a:prstTxWarp prst="textNoShape">
+              <a:avLst/>
+            </a:prstTxWarp>
+          </a:bodyPr>
+          <a:lstStyle/>
+          <a:p>
+            <a:endParaRPr lang="en-BE"/>
+          </a:p>
+        </p:txBody>
+      </p:sp>
+      <p:sp>
+        <p:nvSpPr>
+          <p:cNvPr id="54" name="AutoShape 4" descr="RJ45 Rj11 Rj12 Rj9 Telephone Patch Cord Cat3 Telephone Cable 24AWG 6p6c  Telephone Patch Cord 7 Foot 8 Foot 9 Foot - China Telephone Cable, 4core  Telephone Cable | Made-in-China.com">
+            <a:extLst>
+              <a:ext uri="{FF2B5EF4-FFF2-40B4-BE49-F238E27FC236}">
+                <a16:creationId xmlns:a16="http://schemas.microsoft.com/office/drawing/2014/main" id="{200785FB-16DF-F884-3205-57232A09CC91}"/>
+              </a:ext>
+            </a:extLst>
+          </p:cNvPr>
+          <p:cNvSpPr>
+            <a:spLocks noChangeAspect="1" noChangeArrowheads="1"/>
+          </p:cNvSpPr>
+          <p:nvPr/>
+        </p:nvSpPr>
+        <p:spPr bwMode="auto">
+          <a:xfrm>
+            <a:off x="6096000" y="3429000"/>
+            <a:ext cx="304800" cy="304800"/>
+          </a:xfrm>
+          <a:prstGeom prst="rect">
+            <a:avLst/>
+          </a:prstGeom>
+          <a:noFill/>
+          <a:extLst>
+            <a:ext uri="{909E8E84-426E-40DD-AFC4-6F175D3DCCD1}">
+              <a14:hiddenFill xmlns:a14="http://schemas.microsoft.com/office/drawing/2010/main">
+                <a:solidFill>
+                  <a:srgbClr val="FFFFFF"/>
+                </a:solidFill>
+              </a14:hiddenFill>
+            </a:ext>
+          </a:extLst>
+        </p:spPr>
+        <p:txBody>
+          <a:bodyPr vert="horz" wrap="square" lIns="91440" tIns="45720" rIns="91440" bIns="45720" numCol="1" anchor="t" anchorCtr="0" compatLnSpc="1">
+            <a:prstTxWarp prst="textNoShape">
+              <a:avLst/>
+            </a:prstTxWarp>
+          </a:bodyPr>
+          <a:lstStyle/>
+          <a:p>
+            <a:endParaRPr lang="en-BE"/>
+          </a:p>
+        </p:txBody>
+      </p:sp>
+      <p:sp>
+        <p:nvSpPr>
+          <p:cNvPr id="57" name="TextBox 56">
+            <a:extLst>
+              <a:ext uri="{FF2B5EF4-FFF2-40B4-BE49-F238E27FC236}">
+                <a16:creationId xmlns:a16="http://schemas.microsoft.com/office/drawing/2014/main" id="{7763581E-58E4-72DA-B5C1-67208623370C}"/>
+              </a:ext>
+            </a:extLst>
+          </p:cNvPr>
+          <p:cNvSpPr txBox="1"/>
+          <p:nvPr/>
+        </p:nvSpPr>
+        <p:spPr>
+          <a:xfrm>
+            <a:off x="6335978" y="3555733"/>
+            <a:ext cx="575799" cy="461665"/>
+          </a:xfrm>
+          <a:prstGeom prst="rect">
+            <a:avLst/>
+          </a:prstGeom>
+          <a:noFill/>
+        </p:spPr>
+        <p:txBody>
+          <a:bodyPr wrap="none" rtlCol="0">
+            <a:spAutoFit/>
+          </a:bodyPr>
+          <a:lstStyle/>
+          <a:p>
+            <a:r>
+              <a:rPr lang="en-US" sz="1200" dirty="0">
+                <a:latin typeface="Arial" panose="020B0604020202020204" pitchFamily="34" charset="0"/>
+                <a:cs typeface="Arial" panose="020B0604020202020204" pitchFamily="34" charset="0"/>
+              </a:rPr>
+              <a:t>10K</a:t>
+            </a:r>
+            <a:r>
+              <a:rPr lang="en-US" sz="1200" dirty="0">
+                <a:latin typeface="Symbol" panose="05050102010706020507" pitchFamily="18" charset="2"/>
+              </a:rPr>
+              <a:t>W</a:t>
+            </a:r>
+            <a:endParaRPr lang="en-US" sz="1200" dirty="0">
+              <a:latin typeface="MS Shell Dlg 2" panose="020B0604030504040204" pitchFamily="34" charset="0"/>
+            </a:endParaRPr>
+          </a:p>
+          <a:p>
+            <a:endParaRPr lang="en-BE" sz="1200" dirty="0">
+              <a:latin typeface="Arial" panose="020B0604020202020204" pitchFamily="34" charset="0"/>
+              <a:cs typeface="Arial" panose="020B0604020202020204" pitchFamily="34" charset="0"/>
+            </a:endParaRPr>
+          </a:p>
+        </p:txBody>
+      </p:sp>
+      <p:pic>
+        <p:nvPicPr>
+          <p:cNvPr id="61" name="Picture 60">
+            <a:extLst>
+              <a:ext uri="{FF2B5EF4-FFF2-40B4-BE49-F238E27FC236}">
+                <a16:creationId xmlns:a16="http://schemas.microsoft.com/office/drawing/2014/main" id="{47483A76-195D-980E-186E-26562321F552}"/>
+              </a:ext>
+            </a:extLst>
+          </p:cNvPr>
+          <p:cNvPicPr>
+            <a:picLocks noChangeAspect="1"/>
+          </p:cNvPicPr>
+          <p:nvPr/>
+        </p:nvPicPr>
+        <p:blipFill rotWithShape="1">
+          <a:blip r:embed="rId3"/>
+          <a:srcRect l="49698" t="8912"/>
+          <a:stretch/>
+        </p:blipFill>
+        <p:spPr>
+          <a:xfrm rot="5400000">
+            <a:off x="1425981" y="3506672"/>
+            <a:ext cx="659217" cy="1039429"/>
+          </a:xfrm>
+          <a:prstGeom prst="rect">
+            <a:avLst/>
+          </a:prstGeom>
+        </p:spPr>
+      </p:pic>
+      <p:pic>
+        <p:nvPicPr>
+          <p:cNvPr id="62" name="Picture 2">
+            <a:extLst>
+              <a:ext uri="{FF2B5EF4-FFF2-40B4-BE49-F238E27FC236}">
+                <a16:creationId xmlns:a16="http://schemas.microsoft.com/office/drawing/2014/main" id="{7C29584C-C356-6964-BE51-9AF3994304AA}"/>
+              </a:ext>
+            </a:extLst>
+          </p:cNvPr>
+          <p:cNvPicPr>
+            <a:picLocks noChangeAspect="1" noChangeArrowheads="1"/>
+          </p:cNvPicPr>
+          <p:nvPr/>
+        </p:nvPicPr>
+        <p:blipFill>
+          <a:blip r:embed="rId4">
+            <a:extLst>
+              <a:ext uri="{28A0092B-C50C-407E-A947-70E740481C1C}">
+                <a14:useLocalDpi xmlns:a14="http://schemas.microsoft.com/office/drawing/2010/main" val="0"/>
+              </a:ext>
+            </a:extLst>
+          </a:blip>
+          <a:srcRect/>
+          <a:stretch>
+            <a:fillRect/>
+          </a:stretch>
+        </p:blipFill>
+        <p:spPr bwMode="auto">
+          <a:xfrm>
+            <a:off x="529144" y="3563415"/>
+            <a:ext cx="1316652" cy="741389"/>
+          </a:xfrm>
+          <a:prstGeom prst="rect">
+            <a:avLst/>
+          </a:prstGeom>
+          <a:noFill/>
+          <a:extLst>
+            <a:ext uri="{909E8E84-426E-40DD-AFC4-6F175D3DCCD1}">
+              <a14:hiddenFill xmlns:a14="http://schemas.microsoft.com/office/drawing/2010/main">
+                <a:solidFill>
+                  <a:srgbClr val="FFFFFF"/>
+                </a:solidFill>
+              </a14:hiddenFill>
+            </a:ext>
+          </a:extLst>
+        </p:spPr>
+      </p:pic>
+      <p:pic>
+        <p:nvPicPr>
+          <p:cNvPr id="3" name="Picture 2">
+            <a:extLst>
+              <a:ext uri="{FF2B5EF4-FFF2-40B4-BE49-F238E27FC236}">
+                <a16:creationId xmlns:a16="http://schemas.microsoft.com/office/drawing/2014/main" id="{A294056F-A1A7-2252-6C8C-E9061005E858}"/>
+              </a:ext>
+            </a:extLst>
+          </p:cNvPr>
+          <p:cNvPicPr>
+            <a:picLocks noChangeAspect="1"/>
+          </p:cNvPicPr>
+          <p:nvPr/>
+        </p:nvPicPr>
+        <p:blipFill rotWithShape="1">
+          <a:blip r:embed="rId5"/>
+          <a:srcRect t="27279" r="71469"/>
+          <a:stretch/>
+        </p:blipFill>
+        <p:spPr>
+          <a:xfrm>
+            <a:off x="7341722" y="2680241"/>
+            <a:ext cx="523988" cy="878383"/>
+          </a:xfrm>
+          <a:prstGeom prst="rect">
+            <a:avLst/>
+          </a:prstGeom>
+        </p:spPr>
+      </p:pic>
+      <p:cxnSp>
+        <p:nvCxnSpPr>
           <p:cNvPr id="18" name="Connector: Curved 17">
             <a:extLst>
               <a:ext uri="{FF2B5EF4-FFF2-40B4-BE49-F238E27FC236}">
@@ -3670,26 +4467,27 @@
       </p:cxnSp>
       <p:cxnSp>
         <p:nvCxnSpPr>
-          <p:cNvPr id="23" name="Connector: Curved 22">
-            <a:extLst>
-              <a:ext uri="{FF2B5EF4-FFF2-40B4-BE49-F238E27FC236}">
-                <a16:creationId xmlns:a16="http://schemas.microsoft.com/office/drawing/2014/main" id="{55FF0AC9-90F2-4775-4390-2396E558E726}"/>
+          <p:cNvPr id="4" name="Connector: Curved 3">
+            <a:extLst>
+              <a:ext uri="{FF2B5EF4-FFF2-40B4-BE49-F238E27FC236}">
+                <a16:creationId xmlns:a16="http://schemas.microsoft.com/office/drawing/2014/main" id="{0CD99F6B-B0ED-C029-32BB-803B53E99FC7}"/>
               </a:ext>
             </a:extLst>
           </p:cNvPr>
           <p:cNvCxnSpPr>
             <a:cxnSpLocks/>
-            <a:endCxn id="11" idx="1"/>
           </p:cNvCxnSpPr>
           <p:nvPr/>
         </p:nvCxnSpPr>
         <p:spPr>
-          <a:xfrm rot="16200000" flipH="1">
-            <a:off x="7907134" y="3018569"/>
-            <a:ext cx="386537" cy="377369"/>
-          </a:xfrm>
-          <a:prstGeom prst="curvedConnector2">
-            <a:avLst/>
+          <a:xfrm rot="10800000" flipV="1">
+            <a:off x="7341723" y="2812112"/>
+            <a:ext cx="461905" cy="97743"/>
+          </a:xfrm>
+          <a:prstGeom prst="curvedConnector3">
+            <a:avLst>
+              <a:gd name="adj1" fmla="val 50000"/>
+            </a:avLst>
           </a:prstGeom>
           <a:ln w="12700" cap="flat" cmpd="sng" algn="ctr">
             <a:solidFill>
@@ -3718,10 +4516,10 @@
       </p:cxnSp>
       <p:sp>
         <p:nvSpPr>
-          <p:cNvPr id="29" name="TextBox 28">
-            <a:extLst>
-              <a:ext uri="{FF2B5EF4-FFF2-40B4-BE49-F238E27FC236}">
-                <a16:creationId xmlns:a16="http://schemas.microsoft.com/office/drawing/2014/main" id="{9E1A6D08-F249-C1C4-BD94-13A9543ED8B3}"/>
+          <p:cNvPr id="10" name="TextBox 9">
+            <a:extLst>
+              <a:ext uri="{FF2B5EF4-FFF2-40B4-BE49-F238E27FC236}">
+                <a16:creationId xmlns:a16="http://schemas.microsoft.com/office/drawing/2014/main" id="{DC75F08A-D86C-5DEB-9F29-02E296575701}"/>
               </a:ext>
             </a:extLst>
           </p:cNvPr>
@@ -3730,8 +4528,8 @@
         </p:nvSpPr>
         <p:spPr>
           <a:xfrm>
-            <a:off x="6778353" y="2480693"/>
-            <a:ext cx="526106" cy="276999"/>
+            <a:off x="6981134" y="2758469"/>
+            <a:ext cx="397866" cy="276999"/>
           </a:xfrm>
           <a:prstGeom prst="rect">
             <a:avLst/>
@@ -3749,7 +4547,7 @@
                 <a:latin typeface="Arial" panose="020B0604020202020204" pitchFamily="34" charset="0"/>
                 <a:cs typeface="Arial" panose="020B0604020202020204" pitchFamily="34" charset="0"/>
               </a:rPr>
-              <a:t>GND</a:t>
+              <a:t>EN</a:t>
             </a:r>
             <a:endParaRPr lang="en-BE" sz="1200" dirty="0">
               <a:latin typeface="Arial" panose="020B0604020202020204" pitchFamily="34" charset="0"/>
@@ -3758,684 +4556,6 @@
           </a:p>
         </p:txBody>
       </p:sp>
-      <p:cxnSp>
-        <p:nvCxnSpPr>
-          <p:cNvPr id="32" name="Connector: Curved 31">
-            <a:extLst>
-              <a:ext uri="{FF2B5EF4-FFF2-40B4-BE49-F238E27FC236}">
-                <a16:creationId xmlns:a16="http://schemas.microsoft.com/office/drawing/2014/main" id="{6104BC5F-D891-BC60-9844-6F336D483A21}"/>
-              </a:ext>
-            </a:extLst>
-          </p:cNvPr>
-          <p:cNvCxnSpPr>
-            <a:cxnSpLocks/>
-            <a:endCxn id="35" idx="3"/>
-          </p:cNvCxnSpPr>
-          <p:nvPr/>
-        </p:nvCxnSpPr>
-        <p:spPr>
-          <a:xfrm rot="10800000" flipV="1">
-            <a:off x="2738982" y="4176655"/>
-            <a:ext cx="332751" cy="166434"/>
-          </a:xfrm>
-          <a:prstGeom prst="curvedConnector3">
-            <a:avLst>
-              <a:gd name="adj1" fmla="val 50000"/>
-            </a:avLst>
-          </a:prstGeom>
-          <a:ln w="12700" cap="flat" cmpd="sng" algn="ctr">
-            <a:solidFill>
-              <a:schemeClr val="accent3"/>
-            </a:solidFill>
-            <a:prstDash val="dash"/>
-            <a:round/>
-            <a:headEnd type="none" w="med" len="med"/>
-            <a:tailEnd type="triangle" w="med" len="med"/>
-          </a:ln>
-        </p:spPr>
-        <p:style>
-          <a:lnRef idx="0">
-            <a:scrgbClr r="0" g="0" b="0"/>
-          </a:lnRef>
-          <a:fillRef idx="0">
-            <a:scrgbClr r="0" g="0" b="0"/>
-          </a:fillRef>
-          <a:effectRef idx="0">
-            <a:scrgbClr r="0" g="0" b="0"/>
-          </a:effectRef>
-          <a:fontRef idx="minor">
-            <a:schemeClr val="tx1"/>
-          </a:fontRef>
-        </p:style>
-      </p:cxnSp>
-      <p:sp>
-        <p:nvSpPr>
-          <p:cNvPr id="34" name="TextBox 33">
-            <a:extLst>
-              <a:ext uri="{FF2B5EF4-FFF2-40B4-BE49-F238E27FC236}">
-                <a16:creationId xmlns:a16="http://schemas.microsoft.com/office/drawing/2014/main" id="{D3D37389-8B99-FF18-A098-8427A42158C5}"/>
-              </a:ext>
-            </a:extLst>
-          </p:cNvPr>
-          <p:cNvSpPr txBox="1"/>
-          <p:nvPr/>
-        </p:nvSpPr>
-        <p:spPr>
-          <a:xfrm>
-            <a:off x="2224945" y="3227519"/>
-            <a:ext cx="372218" cy="276999"/>
-          </a:xfrm>
-          <a:prstGeom prst="rect">
-            <a:avLst/>
-          </a:prstGeom>
-          <a:noFill/>
-        </p:spPr>
-        <p:txBody>
-          <a:bodyPr wrap="none" rtlCol="0">
-            <a:spAutoFit/>
-          </a:bodyPr>
-          <a:lstStyle/>
-          <a:p>
-            <a:r>
-              <a:rPr lang="en-US" sz="1200" dirty="0">
-                <a:latin typeface="Arial" panose="020B0604020202020204" pitchFamily="34" charset="0"/>
-                <a:cs typeface="Arial" panose="020B0604020202020204" pitchFamily="34" charset="0"/>
-              </a:rPr>
-              <a:t>5V</a:t>
-            </a:r>
-            <a:endParaRPr lang="en-BE" sz="1200" dirty="0">
-              <a:latin typeface="Arial" panose="020B0604020202020204" pitchFamily="34" charset="0"/>
-              <a:cs typeface="Arial" panose="020B0604020202020204" pitchFamily="34" charset="0"/>
-            </a:endParaRPr>
-          </a:p>
-        </p:txBody>
-      </p:sp>
-      <p:sp>
-        <p:nvSpPr>
-          <p:cNvPr id="35" name="TextBox 34">
-            <a:extLst>
-              <a:ext uri="{FF2B5EF4-FFF2-40B4-BE49-F238E27FC236}">
-                <a16:creationId xmlns:a16="http://schemas.microsoft.com/office/drawing/2014/main" id="{5E90D989-B577-C101-320E-3B6E9D2D733F}"/>
-              </a:ext>
-            </a:extLst>
-          </p:cNvPr>
-          <p:cNvSpPr txBox="1"/>
-          <p:nvPr/>
-        </p:nvSpPr>
-        <p:spPr>
-          <a:xfrm>
-            <a:off x="2212875" y="4204589"/>
-            <a:ext cx="526106" cy="276999"/>
-          </a:xfrm>
-          <a:prstGeom prst="rect">
-            <a:avLst/>
-          </a:prstGeom>
-          <a:noFill/>
-        </p:spPr>
-        <p:txBody>
-          <a:bodyPr wrap="none" rtlCol="0">
-            <a:spAutoFit/>
-          </a:bodyPr>
-          <a:lstStyle/>
-          <a:p>
-            <a:r>
-              <a:rPr lang="en-US" sz="1200" dirty="0">
-                <a:latin typeface="Arial" panose="020B0604020202020204" pitchFamily="34" charset="0"/>
-                <a:cs typeface="Arial" panose="020B0604020202020204" pitchFamily="34" charset="0"/>
-              </a:rPr>
-              <a:t>GND</a:t>
-            </a:r>
-            <a:endParaRPr lang="en-BE" sz="1200" dirty="0">
-              <a:latin typeface="Arial" panose="020B0604020202020204" pitchFamily="34" charset="0"/>
-              <a:cs typeface="Arial" panose="020B0604020202020204" pitchFamily="34" charset="0"/>
-            </a:endParaRPr>
-          </a:p>
-        </p:txBody>
-      </p:sp>
-      <p:sp>
-        <p:nvSpPr>
-          <p:cNvPr id="36" name="TextBox 35">
-            <a:extLst>
-              <a:ext uri="{FF2B5EF4-FFF2-40B4-BE49-F238E27FC236}">
-                <a16:creationId xmlns:a16="http://schemas.microsoft.com/office/drawing/2014/main" id="{DF4658B5-240F-8219-5301-3BE263AFDCB8}"/>
-              </a:ext>
-            </a:extLst>
-          </p:cNvPr>
-          <p:cNvSpPr txBox="1"/>
-          <p:nvPr/>
-        </p:nvSpPr>
-        <p:spPr>
-          <a:xfrm>
-            <a:off x="2224945" y="3971232"/>
-            <a:ext cx="508473" cy="276999"/>
-          </a:xfrm>
-          <a:prstGeom prst="rect">
-            <a:avLst/>
-          </a:prstGeom>
-          <a:noFill/>
-        </p:spPr>
-        <p:txBody>
-          <a:bodyPr wrap="none" rtlCol="0">
-            <a:spAutoFit/>
-          </a:bodyPr>
-          <a:lstStyle/>
-          <a:p>
-            <a:r>
-              <a:rPr lang="en-US" sz="1200" dirty="0">
-                <a:latin typeface="Arial" panose="020B0604020202020204" pitchFamily="34" charset="0"/>
-                <a:cs typeface="Arial" panose="020B0604020202020204" pitchFamily="34" charset="0"/>
-              </a:rPr>
-              <a:t>RXD</a:t>
-            </a:r>
-            <a:endParaRPr lang="en-BE" sz="1200" dirty="0">
-              <a:latin typeface="Arial" panose="020B0604020202020204" pitchFamily="34" charset="0"/>
-              <a:cs typeface="Arial" panose="020B0604020202020204" pitchFamily="34" charset="0"/>
-            </a:endParaRPr>
-          </a:p>
-        </p:txBody>
-      </p:sp>
-      <p:sp>
-        <p:nvSpPr>
-          <p:cNvPr id="37" name="TextBox 36">
-            <a:extLst>
-              <a:ext uri="{FF2B5EF4-FFF2-40B4-BE49-F238E27FC236}">
-                <a16:creationId xmlns:a16="http://schemas.microsoft.com/office/drawing/2014/main" id="{EC6591E1-2055-FBD9-4BB7-6CF13E90B30D}"/>
-              </a:ext>
-            </a:extLst>
-          </p:cNvPr>
-          <p:cNvSpPr txBox="1"/>
-          <p:nvPr/>
-        </p:nvSpPr>
-        <p:spPr>
-          <a:xfrm>
-            <a:off x="2212875" y="3694233"/>
-            <a:ext cx="526106" cy="276999"/>
-          </a:xfrm>
-          <a:prstGeom prst="rect">
-            <a:avLst/>
-          </a:prstGeom>
-          <a:noFill/>
-        </p:spPr>
-        <p:txBody>
-          <a:bodyPr wrap="none" rtlCol="0">
-            <a:spAutoFit/>
-          </a:bodyPr>
-          <a:lstStyle/>
-          <a:p>
-            <a:pPr algn="ctr"/>
-            <a:r>
-              <a:rPr lang="en-US" sz="1200" dirty="0">
-                <a:latin typeface="Arial" panose="020B0604020202020204" pitchFamily="34" charset="0"/>
-                <a:cs typeface="Arial" panose="020B0604020202020204" pitchFamily="34" charset="0"/>
-              </a:rPr>
-              <a:t>GND</a:t>
-            </a:r>
-            <a:endParaRPr lang="en-BE" sz="1200" dirty="0">
-              <a:latin typeface="Arial" panose="020B0604020202020204" pitchFamily="34" charset="0"/>
-              <a:cs typeface="Arial" panose="020B0604020202020204" pitchFamily="34" charset="0"/>
-            </a:endParaRPr>
-          </a:p>
-        </p:txBody>
-      </p:sp>
-      <p:sp>
-        <p:nvSpPr>
-          <p:cNvPr id="38" name="TextBox 37">
-            <a:extLst>
-              <a:ext uri="{FF2B5EF4-FFF2-40B4-BE49-F238E27FC236}">
-                <a16:creationId xmlns:a16="http://schemas.microsoft.com/office/drawing/2014/main" id="{C46353F3-5B5D-2FA3-BE44-8F2362563881}"/>
-              </a:ext>
-            </a:extLst>
-          </p:cNvPr>
-          <p:cNvSpPr txBox="1"/>
-          <p:nvPr/>
-        </p:nvSpPr>
-        <p:spPr>
-          <a:xfrm>
-            <a:off x="2212875" y="3460876"/>
-            <a:ext cx="489686" cy="276999"/>
-          </a:xfrm>
-          <a:prstGeom prst="rect">
-            <a:avLst/>
-          </a:prstGeom>
-          <a:noFill/>
-        </p:spPr>
-        <p:txBody>
-          <a:bodyPr wrap="none" rtlCol="0">
-            <a:spAutoFit/>
-          </a:bodyPr>
-          <a:lstStyle/>
-          <a:p>
-            <a:r>
-              <a:rPr lang="en-US" sz="1200" dirty="0">
-                <a:latin typeface="Arial" panose="020B0604020202020204" pitchFamily="34" charset="0"/>
-                <a:cs typeface="Arial" panose="020B0604020202020204" pitchFamily="34" charset="0"/>
-              </a:rPr>
-              <a:t>RTS</a:t>
-            </a:r>
-            <a:endParaRPr lang="en-BE" sz="1200" dirty="0">
-              <a:latin typeface="Arial" panose="020B0604020202020204" pitchFamily="34" charset="0"/>
-              <a:cs typeface="Arial" panose="020B0604020202020204" pitchFamily="34" charset="0"/>
-            </a:endParaRPr>
-          </a:p>
-        </p:txBody>
-      </p:sp>
-      <p:cxnSp>
-        <p:nvCxnSpPr>
-          <p:cNvPr id="40" name="Connector: Curved 39">
-            <a:extLst>
-              <a:ext uri="{FF2B5EF4-FFF2-40B4-BE49-F238E27FC236}">
-                <a16:creationId xmlns:a16="http://schemas.microsoft.com/office/drawing/2014/main" id="{58872BCD-AAA4-EC5D-9E99-ACF6B9BDA00F}"/>
-              </a:ext>
-            </a:extLst>
-          </p:cNvPr>
-          <p:cNvCxnSpPr>
-            <a:cxnSpLocks/>
-            <a:endCxn id="36" idx="3"/>
-          </p:cNvCxnSpPr>
-          <p:nvPr/>
-        </p:nvCxnSpPr>
-        <p:spPr>
-          <a:xfrm rot="10800000" flipV="1">
-            <a:off x="2733419" y="4031612"/>
-            <a:ext cx="338317" cy="78119"/>
-          </a:xfrm>
-          <a:prstGeom prst="curvedConnector3">
-            <a:avLst>
-              <a:gd name="adj1" fmla="val 50000"/>
-            </a:avLst>
-          </a:prstGeom>
-          <a:ln w="12700" cap="flat" cmpd="sng" algn="ctr">
-            <a:solidFill>
-              <a:schemeClr val="accent3"/>
-            </a:solidFill>
-            <a:prstDash val="dash"/>
-            <a:round/>
-            <a:headEnd type="none" w="med" len="med"/>
-            <a:tailEnd type="triangle" w="med" len="med"/>
-          </a:ln>
-        </p:spPr>
-        <p:style>
-          <a:lnRef idx="0">
-            <a:scrgbClr r="0" g="0" b="0"/>
-          </a:lnRef>
-          <a:fillRef idx="0">
-            <a:scrgbClr r="0" g="0" b="0"/>
-          </a:fillRef>
-          <a:effectRef idx="0">
-            <a:scrgbClr r="0" g="0" b="0"/>
-          </a:effectRef>
-          <a:fontRef idx="minor">
-            <a:schemeClr val="tx1"/>
-          </a:fontRef>
-        </p:style>
-      </p:cxnSp>
-      <p:cxnSp>
-        <p:nvCxnSpPr>
-          <p:cNvPr id="43" name="Connector: Curved 42">
-            <a:extLst>
-              <a:ext uri="{FF2B5EF4-FFF2-40B4-BE49-F238E27FC236}">
-                <a16:creationId xmlns:a16="http://schemas.microsoft.com/office/drawing/2014/main" id="{115DC5BA-8414-55D8-99C5-4E41A8DB99F9}"/>
-              </a:ext>
-            </a:extLst>
-          </p:cNvPr>
-          <p:cNvCxnSpPr>
-            <a:cxnSpLocks/>
-            <a:endCxn id="37" idx="3"/>
-          </p:cNvCxnSpPr>
-          <p:nvPr/>
-        </p:nvCxnSpPr>
-        <p:spPr>
-          <a:xfrm rot="10800000">
-            <a:off x="2738981" y="3832734"/>
-            <a:ext cx="332752" cy="7859"/>
-          </a:xfrm>
-          <a:prstGeom prst="curvedConnector3">
-            <a:avLst>
-              <a:gd name="adj1" fmla="val 50000"/>
-            </a:avLst>
-          </a:prstGeom>
-          <a:ln w="12700" cap="flat" cmpd="sng" algn="ctr">
-            <a:solidFill>
-              <a:schemeClr val="accent3"/>
-            </a:solidFill>
-            <a:prstDash val="dash"/>
-            <a:round/>
-            <a:headEnd type="none" w="med" len="med"/>
-            <a:tailEnd type="triangle" w="med" len="med"/>
-          </a:ln>
-        </p:spPr>
-        <p:style>
-          <a:lnRef idx="0">
-            <a:scrgbClr r="0" g="0" b="0"/>
-          </a:lnRef>
-          <a:fillRef idx="0">
-            <a:scrgbClr r="0" g="0" b="0"/>
-          </a:fillRef>
-          <a:effectRef idx="0">
-            <a:scrgbClr r="0" g="0" b="0"/>
-          </a:effectRef>
-          <a:fontRef idx="minor">
-            <a:schemeClr val="tx1"/>
-          </a:fontRef>
-        </p:style>
-      </p:cxnSp>
-      <p:cxnSp>
-        <p:nvCxnSpPr>
-          <p:cNvPr id="46" name="Connector: Curved 45">
-            <a:extLst>
-              <a:ext uri="{FF2B5EF4-FFF2-40B4-BE49-F238E27FC236}">
-                <a16:creationId xmlns:a16="http://schemas.microsoft.com/office/drawing/2014/main" id="{21A6DAF1-AF42-82E0-F8B5-EF91EE0C8794}"/>
-              </a:ext>
-            </a:extLst>
-          </p:cNvPr>
-          <p:cNvCxnSpPr>
-            <a:cxnSpLocks/>
-          </p:cNvCxnSpPr>
-          <p:nvPr/>
-        </p:nvCxnSpPr>
-        <p:spPr>
-          <a:xfrm rot="10800000">
-            <a:off x="2651385" y="3357149"/>
-            <a:ext cx="420348" cy="283236"/>
-          </a:xfrm>
-          <a:prstGeom prst="curvedConnector3">
-            <a:avLst>
-              <a:gd name="adj1" fmla="val 50000"/>
-            </a:avLst>
-          </a:prstGeom>
-          <a:ln w="12700" cap="flat" cmpd="sng" algn="ctr">
-            <a:solidFill>
-              <a:schemeClr val="accent3"/>
-            </a:solidFill>
-            <a:prstDash val="dash"/>
-            <a:round/>
-            <a:headEnd type="none" w="med" len="med"/>
-            <a:tailEnd type="triangle" w="med" len="med"/>
-          </a:ln>
-        </p:spPr>
-        <p:style>
-          <a:lnRef idx="0">
-            <a:scrgbClr r="0" g="0" b="0"/>
-          </a:lnRef>
-          <a:fillRef idx="0">
-            <a:scrgbClr r="0" g="0" b="0"/>
-          </a:fillRef>
-          <a:effectRef idx="0">
-            <a:scrgbClr r="0" g="0" b="0"/>
-          </a:effectRef>
-          <a:fontRef idx="minor">
-            <a:schemeClr val="tx1"/>
-          </a:fontRef>
-        </p:style>
-      </p:cxnSp>
-      <p:cxnSp>
-        <p:nvCxnSpPr>
-          <p:cNvPr id="49" name="Connector: Curved 48">
-            <a:extLst>
-              <a:ext uri="{FF2B5EF4-FFF2-40B4-BE49-F238E27FC236}">
-                <a16:creationId xmlns:a16="http://schemas.microsoft.com/office/drawing/2014/main" id="{90338CFC-78E6-4967-F0A6-68AAB2688550}"/>
-              </a:ext>
-            </a:extLst>
-          </p:cNvPr>
-          <p:cNvCxnSpPr>
-            <a:cxnSpLocks/>
-          </p:cNvCxnSpPr>
-          <p:nvPr/>
-        </p:nvCxnSpPr>
-        <p:spPr>
-          <a:xfrm rot="10800000">
-            <a:off x="2666141" y="3590506"/>
-            <a:ext cx="405592" cy="153788"/>
-          </a:xfrm>
-          <a:prstGeom prst="curvedConnector3">
-            <a:avLst>
-              <a:gd name="adj1" fmla="val 50000"/>
-            </a:avLst>
-          </a:prstGeom>
-          <a:ln w="12700" cap="flat" cmpd="sng" algn="ctr">
-            <a:solidFill>
-              <a:schemeClr val="accent3"/>
-            </a:solidFill>
-            <a:prstDash val="dash"/>
-            <a:round/>
-            <a:headEnd type="none" w="med" len="med"/>
-            <a:tailEnd type="triangle" w="med" len="med"/>
-          </a:ln>
-        </p:spPr>
-        <p:style>
-          <a:lnRef idx="0">
-            <a:scrgbClr r="0" g="0" b="0"/>
-          </a:lnRef>
-          <a:fillRef idx="0">
-            <a:scrgbClr r="0" g="0" b="0"/>
-          </a:fillRef>
-          <a:effectRef idx="0">
-            <a:scrgbClr r="0" g="0" b="0"/>
-          </a:effectRef>
-          <a:fontRef idx="minor">
-            <a:schemeClr val="tx1"/>
-          </a:fontRef>
-        </p:style>
-      </p:cxnSp>
-      <p:sp>
-        <p:nvSpPr>
-          <p:cNvPr id="53" name="AutoShape 2" descr="RJ45 Rj11 Rj12 Rj9 Telephone Patch Cord Cat3 Telephone Cable 24AWG 6p6c  Telephone Patch Cord 7 Foot 8 Foot 9 Foot - China Telephone Cable, 4core  Telephone Cable | Made-in-China.com">
-            <a:extLst>
-              <a:ext uri="{FF2B5EF4-FFF2-40B4-BE49-F238E27FC236}">
-                <a16:creationId xmlns:a16="http://schemas.microsoft.com/office/drawing/2014/main" id="{AF01B2DC-B839-FCD4-8F6D-E44C478BED41}"/>
-              </a:ext>
-            </a:extLst>
-          </p:cNvPr>
-          <p:cNvSpPr>
-            <a:spLocks noChangeAspect="1" noChangeArrowheads="1"/>
-          </p:cNvSpPr>
-          <p:nvPr/>
-        </p:nvSpPr>
-        <p:spPr bwMode="auto">
-          <a:xfrm>
-            <a:off x="5943600" y="3276600"/>
-            <a:ext cx="304800" cy="304800"/>
-          </a:xfrm>
-          <a:prstGeom prst="rect">
-            <a:avLst/>
-          </a:prstGeom>
-          <a:noFill/>
-          <a:extLst>
-            <a:ext uri="{909E8E84-426E-40DD-AFC4-6F175D3DCCD1}">
-              <a14:hiddenFill xmlns:a14="http://schemas.microsoft.com/office/drawing/2010/main">
-                <a:solidFill>
-                  <a:srgbClr val="FFFFFF"/>
-                </a:solidFill>
-              </a14:hiddenFill>
-            </a:ext>
-          </a:extLst>
-        </p:spPr>
-        <p:txBody>
-          <a:bodyPr vert="horz" wrap="square" lIns="91440" tIns="45720" rIns="91440" bIns="45720" numCol="1" anchor="t" anchorCtr="0" compatLnSpc="1">
-            <a:prstTxWarp prst="textNoShape">
-              <a:avLst/>
-            </a:prstTxWarp>
-          </a:bodyPr>
-          <a:lstStyle/>
-          <a:p>
-            <a:endParaRPr lang="en-BE"/>
-          </a:p>
-        </p:txBody>
-      </p:sp>
-      <p:sp>
-        <p:nvSpPr>
-          <p:cNvPr id="54" name="AutoShape 4" descr="RJ45 Rj11 Rj12 Rj9 Telephone Patch Cord Cat3 Telephone Cable 24AWG 6p6c  Telephone Patch Cord 7 Foot 8 Foot 9 Foot - China Telephone Cable, 4core  Telephone Cable | Made-in-China.com">
-            <a:extLst>
-              <a:ext uri="{FF2B5EF4-FFF2-40B4-BE49-F238E27FC236}">
-                <a16:creationId xmlns:a16="http://schemas.microsoft.com/office/drawing/2014/main" id="{200785FB-16DF-F884-3205-57232A09CC91}"/>
-              </a:ext>
-            </a:extLst>
-          </p:cNvPr>
-          <p:cNvSpPr>
-            <a:spLocks noChangeAspect="1" noChangeArrowheads="1"/>
-          </p:cNvSpPr>
-          <p:nvPr/>
-        </p:nvSpPr>
-        <p:spPr bwMode="auto">
-          <a:xfrm>
-            <a:off x="6096000" y="3429000"/>
-            <a:ext cx="304800" cy="304800"/>
-          </a:xfrm>
-          <a:prstGeom prst="rect">
-            <a:avLst/>
-          </a:prstGeom>
-          <a:noFill/>
-          <a:extLst>
-            <a:ext uri="{909E8E84-426E-40DD-AFC4-6F175D3DCCD1}">
-              <a14:hiddenFill xmlns:a14="http://schemas.microsoft.com/office/drawing/2010/main">
-                <a:solidFill>
-                  <a:srgbClr val="FFFFFF"/>
-                </a:solidFill>
-              </a14:hiddenFill>
-            </a:ext>
-          </a:extLst>
-        </p:spPr>
-        <p:txBody>
-          <a:bodyPr vert="horz" wrap="square" lIns="91440" tIns="45720" rIns="91440" bIns="45720" numCol="1" anchor="t" anchorCtr="0" compatLnSpc="1">
-            <a:prstTxWarp prst="textNoShape">
-              <a:avLst/>
-            </a:prstTxWarp>
-          </a:bodyPr>
-          <a:lstStyle/>
-          <a:p>
-            <a:endParaRPr lang="en-BE"/>
-          </a:p>
-        </p:txBody>
-      </p:sp>
-      <p:sp>
-        <p:nvSpPr>
-          <p:cNvPr id="57" name="TextBox 56">
-            <a:extLst>
-              <a:ext uri="{FF2B5EF4-FFF2-40B4-BE49-F238E27FC236}">
-                <a16:creationId xmlns:a16="http://schemas.microsoft.com/office/drawing/2014/main" id="{7763581E-58E4-72DA-B5C1-67208623370C}"/>
-              </a:ext>
-            </a:extLst>
-          </p:cNvPr>
-          <p:cNvSpPr txBox="1"/>
-          <p:nvPr/>
-        </p:nvSpPr>
-        <p:spPr>
-          <a:xfrm>
-            <a:off x="6335978" y="3555733"/>
-            <a:ext cx="575799" cy="461665"/>
-          </a:xfrm>
-          <a:prstGeom prst="rect">
-            <a:avLst/>
-          </a:prstGeom>
-          <a:noFill/>
-        </p:spPr>
-        <p:txBody>
-          <a:bodyPr wrap="none" rtlCol="0">
-            <a:spAutoFit/>
-          </a:bodyPr>
-          <a:lstStyle/>
-          <a:p>
-            <a:r>
-              <a:rPr lang="en-US" sz="1200" dirty="0">
-                <a:latin typeface="Arial" panose="020B0604020202020204" pitchFamily="34" charset="0"/>
-                <a:cs typeface="Arial" panose="020B0604020202020204" pitchFamily="34" charset="0"/>
-              </a:rPr>
-              <a:t>10K</a:t>
-            </a:r>
-            <a:r>
-              <a:rPr lang="en-US" sz="1200" dirty="0">
-                <a:latin typeface="Symbol" panose="05050102010706020507" pitchFamily="18" charset="2"/>
-              </a:rPr>
-              <a:t>W</a:t>
-            </a:r>
-            <a:endParaRPr lang="en-US" sz="1200" dirty="0">
-              <a:latin typeface="MS Shell Dlg 2" panose="020B0604030504040204" pitchFamily="34" charset="0"/>
-            </a:endParaRPr>
-          </a:p>
-          <a:p>
-            <a:endParaRPr lang="en-BE" sz="1200" dirty="0">
-              <a:latin typeface="Arial" panose="020B0604020202020204" pitchFamily="34" charset="0"/>
-              <a:cs typeface="Arial" panose="020B0604020202020204" pitchFamily="34" charset="0"/>
-            </a:endParaRPr>
-          </a:p>
-        </p:txBody>
-      </p:sp>
-      <p:pic>
-        <p:nvPicPr>
-          <p:cNvPr id="61" name="Picture 60">
-            <a:extLst>
-              <a:ext uri="{FF2B5EF4-FFF2-40B4-BE49-F238E27FC236}">
-                <a16:creationId xmlns:a16="http://schemas.microsoft.com/office/drawing/2014/main" id="{47483A76-195D-980E-186E-26562321F552}"/>
-              </a:ext>
-            </a:extLst>
-          </p:cNvPr>
-          <p:cNvPicPr>
-            <a:picLocks noChangeAspect="1"/>
-          </p:cNvPicPr>
-          <p:nvPr/>
-        </p:nvPicPr>
-        <p:blipFill rotWithShape="1">
-          <a:blip r:embed="rId3"/>
-          <a:srcRect l="49698" t="8912"/>
-          <a:stretch/>
-        </p:blipFill>
-        <p:spPr>
-          <a:xfrm rot="5400000">
-            <a:off x="1425981" y="3506672"/>
-            <a:ext cx="659217" cy="1039429"/>
-          </a:xfrm>
-          <a:prstGeom prst="rect">
-            <a:avLst/>
-          </a:prstGeom>
-        </p:spPr>
-      </p:pic>
-      <p:pic>
-        <p:nvPicPr>
-          <p:cNvPr id="62" name="Picture 2">
-            <a:extLst>
-              <a:ext uri="{FF2B5EF4-FFF2-40B4-BE49-F238E27FC236}">
-                <a16:creationId xmlns:a16="http://schemas.microsoft.com/office/drawing/2014/main" id="{7C29584C-C356-6964-BE51-9AF3994304AA}"/>
-              </a:ext>
-            </a:extLst>
-          </p:cNvPr>
-          <p:cNvPicPr>
-            <a:picLocks noChangeAspect="1" noChangeArrowheads="1"/>
-          </p:cNvPicPr>
-          <p:nvPr/>
-        </p:nvPicPr>
-        <p:blipFill>
-          <a:blip r:embed="rId4">
-            <a:extLst>
-              <a:ext uri="{28A0092B-C50C-407E-A947-70E740481C1C}">
-                <a14:useLocalDpi xmlns:a14="http://schemas.microsoft.com/office/drawing/2010/main" val="0"/>
-              </a:ext>
-            </a:extLst>
-          </a:blip>
-          <a:srcRect/>
-          <a:stretch>
-            <a:fillRect/>
-          </a:stretch>
-        </p:blipFill>
-        <p:spPr bwMode="auto">
-          <a:xfrm>
-            <a:off x="529144" y="3563415"/>
-            <a:ext cx="1316652" cy="741389"/>
-          </a:xfrm>
-          <a:prstGeom prst="rect">
-            <a:avLst/>
-          </a:prstGeom>
-          <a:noFill/>
-          <a:extLst>
-            <a:ext uri="{909E8E84-426E-40DD-AFC4-6F175D3DCCD1}">
-              <a14:hiddenFill xmlns:a14="http://schemas.microsoft.com/office/drawing/2010/main">
-                <a:solidFill>
-                  <a:srgbClr val="FFFFFF"/>
-                </a:solidFill>
-              </a14:hiddenFill>
-            </a:ext>
-          </a:extLst>
-        </p:spPr>
-      </p:pic>
     </p:spTree>
     <p:extLst>
       <p:ext uri="{BB962C8B-B14F-4D97-AF65-F5344CB8AC3E}">

</xml_diff>